<commit_message>
updated slides to indicate .circ file location on lab computers
</commit_message>
<xml_diff>
--- a/cs447_lab8_Oct28.pptx
+++ b/cs447_lab8_Oct28.pptx
@@ -212,7 +212,7 @@
           <a:p>
             <a:fld id="{79DACF82-7282-4538-9925-81D795D18BF0}" type="datetimeFigureOut">
               <a:rPr lang="en-US" smtClean="0"/>
-              <a:t>10/27/2016</a:t>
+              <a:t>10/28/2016</a:t>
             </a:fld>
             <a:endParaRPr lang="en-US"/>
           </a:p>
@@ -610,7 +610,7 @@
           <a:p>
             <a:fld id="{7880F47B-3C72-48E5-9CD2-8B9AE0E9AFF7}" type="datetimeFigureOut">
               <a:rPr lang="en-US" smtClean="0"/>
-              <a:t>10/27/2016</a:t>
+              <a:t>10/28/2016</a:t>
             </a:fld>
             <a:endParaRPr lang="en-US"/>
           </a:p>
@@ -780,7 +780,7 @@
           <a:p>
             <a:fld id="{7880F47B-3C72-48E5-9CD2-8B9AE0E9AFF7}" type="datetimeFigureOut">
               <a:rPr lang="en-US" smtClean="0"/>
-              <a:t>10/27/2016</a:t>
+              <a:t>10/28/2016</a:t>
             </a:fld>
             <a:endParaRPr lang="en-US"/>
           </a:p>
@@ -960,7 +960,7 @@
           <a:p>
             <a:fld id="{7880F47B-3C72-48E5-9CD2-8B9AE0E9AFF7}" type="datetimeFigureOut">
               <a:rPr lang="en-US" smtClean="0"/>
-              <a:t>10/27/2016</a:t>
+              <a:t>10/28/2016</a:t>
             </a:fld>
             <a:endParaRPr lang="en-US"/>
           </a:p>
@@ -1130,7 +1130,7 @@
           <a:p>
             <a:fld id="{7880F47B-3C72-48E5-9CD2-8B9AE0E9AFF7}" type="datetimeFigureOut">
               <a:rPr lang="en-US" smtClean="0"/>
-              <a:t>10/27/2016</a:t>
+              <a:t>10/28/2016</a:t>
             </a:fld>
             <a:endParaRPr lang="en-US"/>
           </a:p>
@@ -1374,7 +1374,7 @@
           <a:p>
             <a:fld id="{7880F47B-3C72-48E5-9CD2-8B9AE0E9AFF7}" type="datetimeFigureOut">
               <a:rPr lang="en-US" smtClean="0"/>
-              <a:t>10/27/2016</a:t>
+              <a:t>10/28/2016</a:t>
             </a:fld>
             <a:endParaRPr lang="en-US"/>
           </a:p>
@@ -1606,7 +1606,7 @@
           <a:p>
             <a:fld id="{7880F47B-3C72-48E5-9CD2-8B9AE0E9AFF7}" type="datetimeFigureOut">
               <a:rPr lang="en-US" smtClean="0"/>
-              <a:t>10/27/2016</a:t>
+              <a:t>10/28/2016</a:t>
             </a:fld>
             <a:endParaRPr lang="en-US"/>
           </a:p>
@@ -1973,7 +1973,7 @@
           <a:p>
             <a:fld id="{7880F47B-3C72-48E5-9CD2-8B9AE0E9AFF7}" type="datetimeFigureOut">
               <a:rPr lang="en-US" smtClean="0"/>
-              <a:t>10/27/2016</a:t>
+              <a:t>10/28/2016</a:t>
             </a:fld>
             <a:endParaRPr lang="en-US"/>
           </a:p>
@@ -2091,7 +2091,7 @@
           <a:p>
             <a:fld id="{7880F47B-3C72-48E5-9CD2-8B9AE0E9AFF7}" type="datetimeFigureOut">
               <a:rPr lang="en-US" smtClean="0"/>
-              <a:t>10/27/2016</a:t>
+              <a:t>10/28/2016</a:t>
             </a:fld>
             <a:endParaRPr lang="en-US"/>
           </a:p>
@@ -2186,7 +2186,7 @@
           <a:p>
             <a:fld id="{7880F47B-3C72-48E5-9CD2-8B9AE0E9AFF7}" type="datetimeFigureOut">
               <a:rPr lang="en-US" smtClean="0"/>
-              <a:t>10/27/2016</a:t>
+              <a:t>10/28/2016</a:t>
             </a:fld>
             <a:endParaRPr lang="en-US"/>
           </a:p>
@@ -2463,7 +2463,7 @@
           <a:p>
             <a:fld id="{7880F47B-3C72-48E5-9CD2-8B9AE0E9AFF7}" type="datetimeFigureOut">
               <a:rPr lang="en-US" smtClean="0"/>
-              <a:t>10/27/2016</a:t>
+              <a:t>10/28/2016</a:t>
             </a:fld>
             <a:endParaRPr lang="en-US"/>
           </a:p>
@@ -2720,7 +2720,7 @@
           <a:p>
             <a:fld id="{7880F47B-3C72-48E5-9CD2-8B9AE0E9AFF7}" type="datetimeFigureOut">
               <a:rPr lang="en-US" smtClean="0"/>
-              <a:t>10/27/2016</a:t>
+              <a:t>10/28/2016</a:t>
             </a:fld>
             <a:endParaRPr lang="en-US"/>
           </a:p>
@@ -2933,7 +2933,7 @@
           <a:p>
             <a:fld id="{7880F47B-3C72-48E5-9CD2-8B9AE0E9AFF7}" type="datetimeFigureOut">
               <a:rPr lang="en-US" smtClean="0"/>
-              <a:t>10/27/2016</a:t>
+              <a:t>10/28/2016</a:t>
             </a:fld>
             <a:endParaRPr lang="en-US"/>
           </a:p>
@@ -3484,6 +3484,13 @@
   <p:clrMapOvr>
     <a:masterClrMapping/>
   </p:clrMapOvr>
+  <p:timing>
+    <p:tnLst>
+      <p:par>
+        <p:cTn id="1" dur="indefinite" restart="never" nodeType="tmRoot"/>
+      </p:par>
+    </p:tnLst>
+  </p:timing>
 </p:sld>
 </file>
 
@@ -3683,6 +3690,13 @@
   <p:clrMapOvr>
     <a:masterClrMapping/>
   </p:clrMapOvr>
+  <p:timing>
+    <p:tnLst>
+      <p:par>
+        <p:cTn id="1" dur="indefinite" restart="never" nodeType="tmRoot"/>
+      </p:par>
+    </p:tnLst>
+  </p:timing>
 </p:sld>
 </file>
 
@@ -3843,6 +3857,13 @@
   <p:clrMapOvr>
     <a:masterClrMapping/>
   </p:clrMapOvr>
+  <p:timing>
+    <p:tnLst>
+      <p:par>
+        <p:cTn id="1" dur="indefinite" restart="never" nodeType="tmRoot"/>
+      </p:par>
+    </p:tnLst>
+  </p:timing>
 </p:sld>
 </file>
 
@@ -3987,6 +4008,13 @@
   <p:clrMapOvr>
     <a:masterClrMapping/>
   </p:clrMapOvr>
+  <p:timing>
+    <p:tnLst>
+      <p:par>
+        <p:cTn id="1" dur="indefinite" restart="never" nodeType="tmRoot"/>
+      </p:par>
+    </p:tnLst>
+  </p:timing>
 </p:sld>
 </file>
 
@@ -4096,6 +4124,62 @@
           </a:p>
         </p:txBody>
       </p:sp>
+      <p:sp>
+        <p:nvSpPr>
+          <p:cNvPr id="2" name="TextBox 1"/>
+          <p:cNvSpPr txBox="1"/>
+          <p:nvPr/>
+        </p:nvSpPr>
+        <p:spPr>
+          <a:xfrm>
+            <a:off x="241540" y="2915728"/>
+            <a:ext cx="8557403" cy="800219"/>
+          </a:xfrm>
+          <a:prstGeom prst="rect">
+            <a:avLst/>
+          </a:prstGeom>
+          <a:noFill/>
+        </p:spPr>
+        <p:txBody>
+          <a:bodyPr wrap="square" rtlCol="0">
+            <a:spAutoFit/>
+          </a:bodyPr>
+          <a:lstStyle/>
+          <a:p>
+            <a:r>
+              <a:rPr lang="en-US" sz="2300" b="1" u="sng" dirty="0" smtClean="0"/>
+              <a:t>Alternative source for </a:t>
+            </a:r>
+            <a:r>
+              <a:rPr lang="en-US" sz="2300" b="1" u="sng" dirty="0" err="1" smtClean="0"/>
+              <a:t>circ</a:t>
+            </a:r>
+            <a:r>
+              <a:rPr lang="en-US" sz="2300" b="1" u="sng" dirty="0" smtClean="0"/>
+              <a:t> file</a:t>
+            </a:r>
+            <a:r>
+              <a:rPr lang="en-US" sz="2300" dirty="0" smtClean="0"/>
+              <a:t>: N</a:t>
+            </a:r>
+            <a:r>
+              <a:rPr lang="en-US" sz="2300" dirty="0"/>
+              <a:t>:\</a:t>
+            </a:r>
+            <a:r>
+              <a:rPr lang="en-US" sz="2300" dirty="0" smtClean="0"/>
+              <a:t>pitt.edu\home\k\m\kmc51</a:t>
+            </a:r>
+          </a:p>
+          <a:p>
+            <a:r>
+              <a:rPr lang="en-US" sz="2300" dirty="0" smtClean="0"/>
+              <a:t>(accessible from the lab computers)</a:t>
+            </a:r>
+            <a:endParaRPr lang="en-US" sz="2300" dirty="0"/>
+          </a:p>
+        </p:txBody>
+      </p:sp>
     </p:spTree>
     <p:extLst>
       <p:ext uri="{BB962C8B-B14F-4D97-AF65-F5344CB8AC3E}">
@@ -4106,6 +4190,13 @@
   <p:clrMapOvr>
     <a:masterClrMapping/>
   </p:clrMapOvr>
+  <p:timing>
+    <p:tnLst>
+      <p:par>
+        <p:cTn id="1" dur="indefinite" restart="never" nodeType="tmRoot"/>
+      </p:par>
+    </p:tnLst>
+  </p:timing>
 </p:sld>
 </file>
 

</xml_diff>